<commit_message>
Updated slides 1 & 3
Signed-off-by: JasonMendoza2008 <lhotteromain@gmail.com>
</commit_message>
<xml_diff>
--- a/Slides/Slides_3.pptx
+++ b/Slides/Slides_3.pptx
@@ -5,33 +5,34 @@
     <p:sldMasterId id="2147483648" r:id="rId1"/>
   </p:sldMasterIdLst>
   <p:notesMasterIdLst>
-    <p:notesMasterId r:id="rId26"/>
+    <p:notesMasterId r:id="rId27"/>
   </p:notesMasterIdLst>
   <p:sldIdLst>
     <p:sldId id="332" r:id="rId2"/>
-    <p:sldId id="256" r:id="rId3"/>
-    <p:sldId id="333" r:id="rId4"/>
-    <p:sldId id="334" r:id="rId5"/>
-    <p:sldId id="335" r:id="rId6"/>
-    <p:sldId id="336" r:id="rId7"/>
-    <p:sldId id="354" r:id="rId8"/>
-    <p:sldId id="337" r:id="rId9"/>
-    <p:sldId id="345" r:id="rId10"/>
-    <p:sldId id="338" r:id="rId11"/>
-    <p:sldId id="346" r:id="rId12"/>
-    <p:sldId id="340" r:id="rId13"/>
-    <p:sldId id="341" r:id="rId14"/>
-    <p:sldId id="355" r:id="rId15"/>
-    <p:sldId id="342" r:id="rId16"/>
-    <p:sldId id="343" r:id="rId17"/>
-    <p:sldId id="344" r:id="rId18"/>
-    <p:sldId id="347" r:id="rId19"/>
-    <p:sldId id="349" r:id="rId20"/>
-    <p:sldId id="350" r:id="rId21"/>
-    <p:sldId id="351" r:id="rId22"/>
-    <p:sldId id="352" r:id="rId23"/>
-    <p:sldId id="353" r:id="rId24"/>
-    <p:sldId id="356" r:id="rId25"/>
+    <p:sldId id="357" r:id="rId3"/>
+    <p:sldId id="256" r:id="rId4"/>
+    <p:sldId id="333" r:id="rId5"/>
+    <p:sldId id="334" r:id="rId6"/>
+    <p:sldId id="335" r:id="rId7"/>
+    <p:sldId id="336" r:id="rId8"/>
+    <p:sldId id="354" r:id="rId9"/>
+    <p:sldId id="337" r:id="rId10"/>
+    <p:sldId id="345" r:id="rId11"/>
+    <p:sldId id="338" r:id="rId12"/>
+    <p:sldId id="346" r:id="rId13"/>
+    <p:sldId id="340" r:id="rId14"/>
+    <p:sldId id="341" r:id="rId15"/>
+    <p:sldId id="355" r:id="rId16"/>
+    <p:sldId id="342" r:id="rId17"/>
+    <p:sldId id="343" r:id="rId18"/>
+    <p:sldId id="344" r:id="rId19"/>
+    <p:sldId id="347" r:id="rId20"/>
+    <p:sldId id="349" r:id="rId21"/>
+    <p:sldId id="350" r:id="rId22"/>
+    <p:sldId id="351" r:id="rId23"/>
+    <p:sldId id="352" r:id="rId24"/>
+    <p:sldId id="353" r:id="rId25"/>
+    <p:sldId id="356" r:id="rId26"/>
   </p:sldIdLst>
   <p:sldSz cx="12192000" cy="6858000"/>
   <p:notesSz cx="6858000" cy="9144000"/>
@@ -743,7 +744,7 @@
           <a:p>
             <a:fld id="{207C662F-A001-4EA2-B345-C237CD6465E1}" type="datetimeFigureOut">
               <a:rPr lang="en-US" smtClean="0"/>
-              <a:t>1/14/2024</a:t>
+              <a:t>1/13/2025</a:t>
             </a:fld>
             <a:endParaRPr lang="en-US"/>
           </a:p>
@@ -1078,7 +1079,7 @@
           <a:p>
             <a:fld id="{B2732108-1823-42F2-979D-D6CF9D74D210}" type="slidenum">
               <a:rPr lang="en-US" smtClean="0"/>
-              <a:t>3</a:t>
+              <a:t>4</a:t>
             </a:fld>
             <a:endParaRPr lang="en-US"/>
           </a:p>
@@ -1173,7 +1174,7 @@
           <a:p>
             <a:fld id="{B2732108-1823-42F2-979D-D6CF9D74D210}" type="slidenum">
               <a:rPr lang="en-US" smtClean="0"/>
-              <a:t>13</a:t>
+              <a:t>14</a:t>
             </a:fld>
             <a:endParaRPr lang="en-US"/>
           </a:p>
@@ -1268,7 +1269,7 @@
           <a:p>
             <a:fld id="{B2732108-1823-42F2-979D-D6CF9D74D210}" type="slidenum">
               <a:rPr lang="en-US" smtClean="0"/>
-              <a:t>14</a:t>
+              <a:t>15</a:t>
             </a:fld>
             <a:endParaRPr lang="en-US"/>
           </a:p>
@@ -1363,7 +1364,7 @@
           <a:p>
             <a:fld id="{B2732108-1823-42F2-979D-D6CF9D74D210}" type="slidenum">
               <a:rPr lang="en-US" smtClean="0"/>
-              <a:t>15</a:t>
+              <a:t>16</a:t>
             </a:fld>
             <a:endParaRPr lang="en-US"/>
           </a:p>
@@ -1447,7 +1448,7 @@
           <a:p>
             <a:fld id="{B2732108-1823-42F2-979D-D6CF9D74D210}" type="slidenum">
               <a:rPr lang="en-US" smtClean="0"/>
-              <a:t>16</a:t>
+              <a:t>17</a:t>
             </a:fld>
             <a:endParaRPr lang="en-US"/>
           </a:p>
@@ -1589,7 +1590,7 @@
           <a:p>
             <a:fld id="{B2732108-1823-42F2-979D-D6CF9D74D210}" type="slidenum">
               <a:rPr lang="en-US" smtClean="0"/>
-              <a:t>17</a:t>
+              <a:t>18</a:t>
             </a:fld>
             <a:endParaRPr lang="en-US"/>
           </a:p>
@@ -1673,7 +1674,7 @@
           <a:p>
             <a:fld id="{B2732108-1823-42F2-979D-D6CF9D74D210}" type="slidenum">
               <a:rPr lang="en-US" smtClean="0"/>
-              <a:t>18</a:t>
+              <a:t>19</a:t>
             </a:fld>
             <a:endParaRPr lang="en-US"/>
           </a:p>
@@ -1773,7 +1774,7 @@
           <a:p>
             <a:fld id="{B2732108-1823-42F2-979D-D6CF9D74D210}" type="slidenum">
               <a:rPr lang="en-US" smtClean="0"/>
-              <a:t>19</a:t>
+              <a:t>20</a:t>
             </a:fld>
             <a:endParaRPr lang="en-US"/>
           </a:p>
@@ -1877,7 +1878,7 @@
           <a:p>
             <a:fld id="{B2732108-1823-42F2-979D-D6CF9D74D210}" type="slidenum">
               <a:rPr lang="en-US" smtClean="0"/>
-              <a:t>20</a:t>
+              <a:t>21</a:t>
             </a:fld>
             <a:endParaRPr lang="en-US"/>
           </a:p>
@@ -1961,7 +1962,7 @@
           <a:p>
             <a:fld id="{B2732108-1823-42F2-979D-D6CF9D74D210}" type="slidenum">
               <a:rPr lang="en-US" smtClean="0"/>
-              <a:t>21</a:t>
+              <a:t>22</a:t>
             </a:fld>
             <a:endParaRPr lang="en-US"/>
           </a:p>
@@ -2102,7 +2103,7 @@
           <a:p>
             <a:fld id="{B2732108-1823-42F2-979D-D6CF9D74D210}" type="slidenum">
               <a:rPr lang="en-US" smtClean="0"/>
-              <a:t>22</a:t>
+              <a:t>23</a:t>
             </a:fld>
             <a:endParaRPr lang="en-US"/>
           </a:p>
@@ -2455,7 +2456,7 @@
           <a:p>
             <a:fld id="{B2732108-1823-42F2-979D-D6CF9D74D210}" type="slidenum">
               <a:rPr lang="en-US" smtClean="0"/>
-              <a:t>5</a:t>
+              <a:t>6</a:t>
             </a:fld>
             <a:endParaRPr lang="en-US"/>
           </a:p>
@@ -2611,7 +2612,7 @@
           <a:p>
             <a:fld id="{B2732108-1823-42F2-979D-D6CF9D74D210}" type="slidenum">
               <a:rPr lang="en-US" smtClean="0"/>
-              <a:t>23</a:t>
+              <a:t>24</a:t>
             </a:fld>
             <a:endParaRPr lang="en-US"/>
           </a:p>
@@ -2695,7 +2696,7 @@
           <a:p>
             <a:fld id="{B2732108-1823-42F2-979D-D6CF9D74D210}" type="slidenum">
               <a:rPr lang="en-US" smtClean="0"/>
-              <a:t>24</a:t>
+              <a:t>25</a:t>
             </a:fld>
             <a:endParaRPr lang="en-US"/>
           </a:p>
@@ -2793,7 +2794,7 @@
           <a:p>
             <a:fld id="{B2732108-1823-42F2-979D-D6CF9D74D210}" type="slidenum">
               <a:rPr lang="en-US" smtClean="0"/>
-              <a:t>6</a:t>
+              <a:t>7</a:t>
             </a:fld>
             <a:endParaRPr lang="en-US"/>
           </a:p>
@@ -2877,7 +2878,7 @@
           <a:p>
             <a:fld id="{B2732108-1823-42F2-979D-D6CF9D74D210}" type="slidenum">
               <a:rPr lang="en-US" smtClean="0"/>
-              <a:t>7</a:t>
+              <a:t>8</a:t>
             </a:fld>
             <a:endParaRPr lang="en-US"/>
           </a:p>
@@ -3019,7 +3020,7 @@
           <a:p>
             <a:fld id="{B2732108-1823-42F2-979D-D6CF9D74D210}" type="slidenum">
               <a:rPr lang="en-US" smtClean="0"/>
-              <a:t>8</a:t>
+              <a:t>9</a:t>
             </a:fld>
             <a:endParaRPr lang="en-US"/>
           </a:p>
@@ -3151,7 +3152,7 @@
           <a:p>
             <a:fld id="{B2732108-1823-42F2-979D-D6CF9D74D210}" type="slidenum">
               <a:rPr lang="en-US" smtClean="0"/>
-              <a:t>9</a:t>
+              <a:t>10</a:t>
             </a:fld>
             <a:endParaRPr lang="en-US"/>
           </a:p>
@@ -3288,7 +3289,7 @@
           <a:p>
             <a:fld id="{B2732108-1823-42F2-979D-D6CF9D74D210}" type="slidenum">
               <a:rPr lang="en-US" smtClean="0"/>
-              <a:t>10</a:t>
+              <a:t>11</a:t>
             </a:fld>
             <a:endParaRPr lang="en-US"/>
           </a:p>
@@ -3399,7 +3400,7 @@
           <a:p>
             <a:fld id="{B2732108-1823-42F2-979D-D6CF9D74D210}" type="slidenum">
               <a:rPr lang="en-US" smtClean="0"/>
-              <a:t>11</a:t>
+              <a:t>12</a:t>
             </a:fld>
             <a:endParaRPr lang="en-US"/>
           </a:p>
@@ -3486,7 +3487,7 @@
           <a:p>
             <a:fld id="{B2732108-1823-42F2-979D-D6CF9D74D210}" type="slidenum">
               <a:rPr lang="en-US" smtClean="0"/>
-              <a:t>12</a:t>
+              <a:t>13</a:t>
             </a:fld>
             <a:endParaRPr lang="en-US"/>
           </a:p>
@@ -3652,7 +3653,7 @@
           <a:p>
             <a:fld id="{4F06803B-D602-4C3D-AD5C-468F46C70933}" type="datetimeFigureOut">
               <a:rPr lang="en-US" smtClean="0"/>
-              <a:t>1/14/2024</a:t>
+              <a:t>1/13/2025</a:t>
             </a:fld>
             <a:endParaRPr lang="en-US"/>
           </a:p>
@@ -3850,7 +3851,7 @@
           <a:p>
             <a:fld id="{4F06803B-D602-4C3D-AD5C-468F46C70933}" type="datetimeFigureOut">
               <a:rPr lang="en-US" smtClean="0"/>
-              <a:t>1/14/2024</a:t>
+              <a:t>1/13/2025</a:t>
             </a:fld>
             <a:endParaRPr lang="en-US"/>
           </a:p>
@@ -4058,7 +4059,7 @@
           <a:p>
             <a:fld id="{4F06803B-D602-4C3D-AD5C-468F46C70933}" type="datetimeFigureOut">
               <a:rPr lang="en-US" smtClean="0"/>
-              <a:t>1/14/2024</a:t>
+              <a:t>1/13/2025</a:t>
             </a:fld>
             <a:endParaRPr lang="en-US"/>
           </a:p>
@@ -4256,7 +4257,7 @@
           <a:p>
             <a:fld id="{4F06803B-D602-4C3D-AD5C-468F46C70933}" type="datetimeFigureOut">
               <a:rPr lang="en-US" smtClean="0"/>
-              <a:t>1/14/2024</a:t>
+              <a:t>1/13/2025</a:t>
             </a:fld>
             <a:endParaRPr lang="en-US"/>
           </a:p>
@@ -4531,7 +4532,7 @@
           <a:p>
             <a:fld id="{4F06803B-D602-4C3D-AD5C-468F46C70933}" type="datetimeFigureOut">
               <a:rPr lang="en-US" smtClean="0"/>
-              <a:t>1/14/2024</a:t>
+              <a:t>1/13/2025</a:t>
             </a:fld>
             <a:endParaRPr lang="en-US"/>
           </a:p>
@@ -4796,7 +4797,7 @@
           <a:p>
             <a:fld id="{4F06803B-D602-4C3D-AD5C-468F46C70933}" type="datetimeFigureOut">
               <a:rPr lang="en-US" smtClean="0"/>
-              <a:t>1/14/2024</a:t>
+              <a:t>1/13/2025</a:t>
             </a:fld>
             <a:endParaRPr lang="en-US"/>
           </a:p>
@@ -5208,7 +5209,7 @@
           <a:p>
             <a:fld id="{4F06803B-D602-4C3D-AD5C-468F46C70933}" type="datetimeFigureOut">
               <a:rPr lang="en-US" smtClean="0"/>
-              <a:t>1/14/2024</a:t>
+              <a:t>1/13/2025</a:t>
             </a:fld>
             <a:endParaRPr lang="en-US"/>
           </a:p>
@@ -5349,7 +5350,7 @@
           <a:p>
             <a:fld id="{4F06803B-D602-4C3D-AD5C-468F46C70933}" type="datetimeFigureOut">
               <a:rPr lang="en-US" smtClean="0"/>
-              <a:t>1/14/2024</a:t>
+              <a:t>1/13/2025</a:t>
             </a:fld>
             <a:endParaRPr lang="en-US"/>
           </a:p>
@@ -5462,7 +5463,7 @@
           <a:p>
             <a:fld id="{4F06803B-D602-4C3D-AD5C-468F46C70933}" type="datetimeFigureOut">
               <a:rPr lang="en-US" smtClean="0"/>
-              <a:t>1/14/2024</a:t>
+              <a:t>1/13/2025</a:t>
             </a:fld>
             <a:endParaRPr lang="en-US"/>
           </a:p>
@@ -5773,7 +5774,7 @@
           <a:p>
             <a:fld id="{4F06803B-D602-4C3D-AD5C-468F46C70933}" type="datetimeFigureOut">
               <a:rPr lang="en-US" smtClean="0"/>
-              <a:t>1/14/2024</a:t>
+              <a:t>1/13/2025</a:t>
             </a:fld>
             <a:endParaRPr lang="en-US"/>
           </a:p>
@@ -6061,7 +6062,7 @@
           <a:p>
             <a:fld id="{4F06803B-D602-4C3D-AD5C-468F46C70933}" type="datetimeFigureOut">
               <a:rPr lang="en-US" smtClean="0"/>
-              <a:t>1/14/2024</a:t>
+              <a:t>1/13/2025</a:t>
             </a:fld>
             <a:endParaRPr lang="en-US"/>
           </a:p>
@@ -6302,7 +6303,7 @@
           <a:p>
             <a:fld id="{4F06803B-D602-4C3D-AD5C-468F46C70933}" type="datetimeFigureOut">
               <a:rPr lang="en-US" smtClean="0"/>
-              <a:t>1/14/2024</a:t>
+              <a:t>1/13/2025</a:t>
             </a:fld>
             <a:endParaRPr lang="en-US"/>
           </a:p>
@@ -6860,6 +6861,188 @@
       </p:sp>
       <p:pic>
         <p:nvPicPr>
+          <p:cNvPr id="7" name="Picture 6">
+            <a:extLst>
+              <a:ext uri="{FF2B5EF4-FFF2-40B4-BE49-F238E27FC236}">
+                <a16:creationId xmlns:a16="http://schemas.microsoft.com/office/drawing/2014/main" id="{9882887F-2359-65FC-4040-10214D45762A}"/>
+              </a:ext>
+            </a:extLst>
+          </p:cNvPr>
+          <p:cNvPicPr>
+            <a:picLocks noChangeAspect="1"/>
+          </p:cNvPicPr>
+          <p:nvPr/>
+        </p:nvPicPr>
+        <p:blipFill>
+          <a:blip r:embed="rId3"/>
+          <a:stretch>
+            <a:fillRect/>
+          </a:stretch>
+        </p:blipFill>
+        <p:spPr>
+          <a:xfrm>
+            <a:off x="1050468" y="1830133"/>
+            <a:ext cx="9605242" cy="3813847"/>
+          </a:xfrm>
+          <a:prstGeom prst="rect">
+            <a:avLst/>
+          </a:prstGeom>
+        </p:spPr>
+      </p:pic>
+      <p:sp>
+        <p:nvSpPr>
+          <p:cNvPr id="8" name="Rectangle 7">
+            <a:extLst>
+              <a:ext uri="{FF2B5EF4-FFF2-40B4-BE49-F238E27FC236}">
+                <a16:creationId xmlns:a16="http://schemas.microsoft.com/office/drawing/2014/main" id="{DF8F17C0-85F0-1605-7332-6617921D4CA2}"/>
+              </a:ext>
+            </a:extLst>
+          </p:cNvPr>
+          <p:cNvSpPr/>
+          <p:nvPr/>
+        </p:nvSpPr>
+        <p:spPr>
+          <a:xfrm>
+            <a:off x="7643813" y="1830133"/>
+            <a:ext cx="2133599" cy="315757"/>
+          </a:xfrm>
+          <a:prstGeom prst="rect">
+            <a:avLst/>
+          </a:prstGeom>
+          <a:solidFill>
+            <a:schemeClr val="bg1"/>
+          </a:solidFill>
+          <a:ln>
+            <a:solidFill>
+              <a:schemeClr val="bg1"/>
+            </a:solidFill>
+          </a:ln>
+        </p:spPr>
+        <p:style>
+          <a:lnRef idx="2">
+            <a:schemeClr val="accent1">
+              <a:shade val="50000"/>
+            </a:schemeClr>
+          </a:lnRef>
+          <a:fillRef idx="1">
+            <a:schemeClr val="accent1"/>
+          </a:fillRef>
+          <a:effectRef idx="0">
+            <a:schemeClr val="accent1"/>
+          </a:effectRef>
+          <a:fontRef idx="minor">
+            <a:schemeClr val="lt1"/>
+          </a:fontRef>
+        </p:style>
+        <p:txBody>
+          <a:bodyPr rtlCol="0" anchor="ctr"/>
+          <a:lstStyle/>
+          <a:p>
+            <a:pPr algn="ctr"/>
+            <a:r>
+              <a:rPr lang="fr-FR" sz="1600" dirty="0">
+                <a:solidFill>
+                  <a:schemeClr val="tx1"/>
+                </a:solidFill>
+              </a:rPr>
+              <a:t>Constant </a:t>
+            </a:r>
+            <a:r>
+              <a:rPr lang="fr-FR" sz="1600" dirty="0" err="1">
+                <a:solidFill>
+                  <a:schemeClr val="tx1"/>
+                </a:solidFill>
+              </a:rPr>
+              <a:t>learning</a:t>
+            </a:r>
+            <a:r>
+              <a:rPr lang="fr-FR" sz="1600" dirty="0">
+                <a:solidFill>
+                  <a:schemeClr val="tx1"/>
+                </a:solidFill>
+              </a:rPr>
+              <a:t> rate</a:t>
+            </a:r>
+          </a:p>
+        </p:txBody>
+      </p:sp>
+    </p:spTree>
+    <p:extLst>
+      <p:ext uri="{BB962C8B-B14F-4D97-AF65-F5344CB8AC3E}">
+        <p14:creationId xmlns:p14="http://schemas.microsoft.com/office/powerpoint/2010/main" val="1110710355"/>
+      </p:ext>
+    </p:extLst>
+  </p:cSld>
+  <p:clrMapOvr>
+    <a:masterClrMapping/>
+  </p:clrMapOvr>
+  <mc:AlternateContent xmlns:mc="http://schemas.openxmlformats.org/markup-compatibility/2006" xmlns:p14="http://schemas.microsoft.com/office/powerpoint/2010/main">
+    <mc:Choice Requires="p14">
+      <p:transition spd="med" p14:dur="700">
+        <p:fade/>
+      </p:transition>
+    </mc:Choice>
+    <mc:Fallback xmlns="">
+      <p:transition spd="med">
+        <p:fade/>
+      </p:transition>
+    </mc:Fallback>
+  </mc:AlternateContent>
+</p:sld>
+</file>
+
+<file path=ppt/slides/slide11.xml><?xml version="1.0" encoding="utf-8"?>
+<p:sld xmlns:a="http://schemas.openxmlformats.org/drawingml/2006/main" xmlns:r="http://schemas.openxmlformats.org/officeDocument/2006/relationships" xmlns:p="http://schemas.openxmlformats.org/presentationml/2006/main">
+  <p:cSld>
+    <p:spTree>
+      <p:nvGrpSpPr>
+        <p:cNvPr id="1" name=""/>
+        <p:cNvGrpSpPr/>
+        <p:nvPr/>
+      </p:nvGrpSpPr>
+      <p:grpSpPr>
+        <a:xfrm>
+          <a:off x="0" y="0"/>
+          <a:ext cx="0" cy="0"/>
+          <a:chOff x="0" y="0"/>
+          <a:chExt cx="0" cy="0"/>
+        </a:xfrm>
+      </p:grpSpPr>
+      <p:sp>
+        <p:nvSpPr>
+          <p:cNvPr id="5" name="Title 4">
+            <a:extLst>
+              <a:ext uri="{FF2B5EF4-FFF2-40B4-BE49-F238E27FC236}">
+                <a16:creationId xmlns:a16="http://schemas.microsoft.com/office/drawing/2014/main" id="{64213D2F-A106-3319-AA98-37F0C11F906C}"/>
+              </a:ext>
+            </a:extLst>
+          </p:cNvPr>
+          <p:cNvSpPr>
+            <a:spLocks noGrp="1"/>
+          </p:cNvSpPr>
+          <p:nvPr>
+            <p:ph type="title"/>
+          </p:nvPr>
+        </p:nvSpPr>
+        <p:spPr/>
+        <p:txBody>
+          <a:bodyPr/>
+          <a:lstStyle/>
+          <a:p>
+            <a:r>
+              <a:rPr lang="en-US" dirty="0"/>
+              <a:t>Learning </a:t>
+            </a:r>
+            <a:r>
+              <a:rPr lang="en-US"/>
+              <a:t>rate scheduling</a:t>
+            </a:r>
+            <a:endParaRPr lang="en-US" dirty="0"/>
+          </a:p>
+        </p:txBody>
+      </p:sp>
+      <p:pic>
+        <p:nvPicPr>
           <p:cNvPr id="8" name="Picture 7" descr="A picture containing chart&#10;&#10;Description automatically generated">
             <a:extLst>
               <a:ext uri="{FF2B5EF4-FFF2-40B4-BE49-F238E27FC236}">
@@ -7009,7 +7192,7 @@
 </p:sld>
 </file>
 
-<file path=ppt/slides/slide11.xml><?xml version="1.0" encoding="utf-8"?>
+<file path=ppt/slides/slide12.xml><?xml version="1.0" encoding="utf-8"?>
 <p:sld xmlns:a="http://schemas.openxmlformats.org/drawingml/2006/main" xmlns:r="http://schemas.openxmlformats.org/officeDocument/2006/relationships" xmlns:p="http://schemas.openxmlformats.org/presentationml/2006/main">
   <p:cSld>
     <p:spTree>
@@ -7254,7 +7437,7 @@
 </p:sld>
 </file>
 
-<file path=ppt/slides/slide12.xml><?xml version="1.0" encoding="utf-8"?>
+<file path=ppt/slides/slide13.xml><?xml version="1.0" encoding="utf-8"?>
 <p:sld xmlns:a="http://schemas.openxmlformats.org/drawingml/2006/main" xmlns:r="http://schemas.openxmlformats.org/officeDocument/2006/relationships" xmlns:p="http://schemas.openxmlformats.org/presentationml/2006/main">
   <p:cSld>
     <p:spTree>
@@ -7332,7 +7515,7 @@
 </p:sld>
 </file>
 
-<file path=ppt/slides/slide13.xml><?xml version="1.0" encoding="utf-8"?>
+<file path=ppt/slides/slide14.xml><?xml version="1.0" encoding="utf-8"?>
 <p:sld xmlns:a="http://schemas.openxmlformats.org/drawingml/2006/main" xmlns:r="http://schemas.openxmlformats.org/officeDocument/2006/relationships" xmlns:p="http://schemas.openxmlformats.org/presentationml/2006/main">
   <p:cSld>
     <p:spTree>
@@ -7515,7 +7698,7 @@
 </p:sld>
 </file>
 
-<file path=ppt/slides/slide14.xml><?xml version="1.0" encoding="utf-8"?>
+<file path=ppt/slides/slide15.xml><?xml version="1.0" encoding="utf-8"?>
 <p:sld xmlns:a="http://schemas.openxmlformats.org/drawingml/2006/main" xmlns:r="http://schemas.openxmlformats.org/officeDocument/2006/relationships" xmlns:p="http://schemas.openxmlformats.org/presentationml/2006/main">
   <p:cSld>
     <p:spTree>
@@ -7720,7 +7903,7 @@
 </p:sld>
 </file>
 
-<file path=ppt/slides/slide15.xml><?xml version="1.0" encoding="utf-8"?>
+<file path=ppt/slides/slide16.xml><?xml version="1.0" encoding="utf-8"?>
 <p:sld xmlns:a="http://schemas.openxmlformats.org/drawingml/2006/main" xmlns:r="http://schemas.openxmlformats.org/officeDocument/2006/relationships" xmlns:p="http://schemas.openxmlformats.org/presentationml/2006/main">
   <p:cSld>
     <p:spTree>
@@ -8486,7 +8669,7 @@
 </p:sld>
 </file>
 
-<file path=ppt/slides/slide16.xml><?xml version="1.0" encoding="utf-8"?>
+<file path=ppt/slides/slide17.xml><?xml version="1.0" encoding="utf-8"?>
 <p:sld xmlns:a="http://schemas.openxmlformats.org/drawingml/2006/main" xmlns:r="http://schemas.openxmlformats.org/officeDocument/2006/relationships" xmlns:p="http://schemas.openxmlformats.org/presentationml/2006/main">
   <p:cSld>
     <p:spTree>
@@ -8623,7 +8806,7 @@
 </p:sld>
 </file>
 
-<file path=ppt/slides/slide17.xml><?xml version="1.0" encoding="utf-8"?>
+<file path=ppt/slides/slide18.xml><?xml version="1.0" encoding="utf-8"?>
 <p:sld xmlns:a="http://schemas.openxmlformats.org/drawingml/2006/main" xmlns:r="http://schemas.openxmlformats.org/officeDocument/2006/relationships" xmlns:p="http://schemas.openxmlformats.org/presentationml/2006/main">
   <p:cSld>
     <p:spTree>
@@ -8802,7 +8985,7 @@
 </p:sld>
 </file>
 
-<file path=ppt/slides/slide18.xml><?xml version="1.0" encoding="utf-8"?>
+<file path=ppt/slides/slide19.xml><?xml version="1.0" encoding="utf-8"?>
 <p:sld xmlns:a="http://schemas.openxmlformats.org/drawingml/2006/main" xmlns:r="http://schemas.openxmlformats.org/officeDocument/2006/relationships" xmlns:p="http://schemas.openxmlformats.org/presentationml/2006/main">
   <p:cSld>
     <p:spTree>
@@ -9327,7 +9510,245 @@
 </p:sld>
 </file>
 
-<file path=ppt/slides/slide19.xml><?xml version="1.0" encoding="utf-8"?>
+<file path=ppt/slides/slide2.xml><?xml version="1.0" encoding="utf-8"?>
+<p:sld xmlns:a="http://schemas.openxmlformats.org/drawingml/2006/main" xmlns:r="http://schemas.openxmlformats.org/officeDocument/2006/relationships" xmlns:p="http://schemas.openxmlformats.org/presentationml/2006/main">
+  <p:cSld>
+    <p:spTree>
+      <p:nvGrpSpPr>
+        <p:cNvPr id="1" name=""/>
+        <p:cNvGrpSpPr/>
+        <p:nvPr/>
+      </p:nvGrpSpPr>
+      <p:grpSpPr>
+        <a:xfrm>
+          <a:off x="0" y="0"/>
+          <a:ext cx="0" cy="0"/>
+          <a:chOff x="0" y="0"/>
+          <a:chExt cx="0" cy="0"/>
+        </a:xfrm>
+      </p:grpSpPr>
+      <p:sp>
+        <p:nvSpPr>
+          <p:cNvPr id="2" name="Title 1">
+            <a:extLst>
+              <a:ext uri="{FF2B5EF4-FFF2-40B4-BE49-F238E27FC236}">
+                <a16:creationId xmlns:a16="http://schemas.microsoft.com/office/drawing/2014/main" id="{08AE2DED-E00F-8D55-C9F9-F02FA9C83AD0}"/>
+              </a:ext>
+            </a:extLst>
+          </p:cNvPr>
+          <p:cNvSpPr>
+            <a:spLocks noGrp="1"/>
+          </p:cNvSpPr>
+          <p:nvPr>
+            <p:ph type="title"/>
+          </p:nvPr>
+        </p:nvSpPr>
+        <p:spPr/>
+        <p:txBody>
+          <a:bodyPr/>
+          <a:lstStyle/>
+          <a:p>
+            <a:r>
+              <a:rPr lang="fr-FR" dirty="0" err="1"/>
+              <a:t>Outline</a:t>
+            </a:r>
+            <a:r>
+              <a:rPr lang="fr-FR" dirty="0"/>
+              <a:t> of the class</a:t>
+            </a:r>
+          </a:p>
+        </p:txBody>
+      </p:sp>
+      <p:sp>
+        <p:nvSpPr>
+          <p:cNvPr id="3" name="Content Placeholder 2">
+            <a:extLst>
+              <a:ext uri="{FF2B5EF4-FFF2-40B4-BE49-F238E27FC236}">
+                <a16:creationId xmlns:a16="http://schemas.microsoft.com/office/drawing/2014/main" id="{08838BA3-12FC-4A9A-D913-8A7375B051B9}"/>
+              </a:ext>
+            </a:extLst>
+          </p:cNvPr>
+          <p:cNvSpPr>
+            <a:spLocks noGrp="1"/>
+          </p:cNvSpPr>
+          <p:nvPr>
+            <p:ph idx="1"/>
+          </p:nvPr>
+        </p:nvSpPr>
+        <p:spPr>
+          <a:xfrm>
+            <a:off x="838200" y="1825625"/>
+            <a:ext cx="10751820" cy="4351338"/>
+          </a:xfrm>
+        </p:spPr>
+        <p:txBody>
+          <a:bodyPr>
+            <a:normAutofit fontScale="92500" lnSpcReduction="20000"/>
+          </a:bodyPr>
+          <a:lstStyle/>
+          <a:p>
+            <a:pPr marL="514350" indent="-514350">
+              <a:lnSpc>
+                <a:spcPct val="110000"/>
+              </a:lnSpc>
+              <a:buFont typeface="+mj-lt"/>
+              <a:buAutoNum type="arabicPeriod"/>
+            </a:pPr>
+            <a:r>
+              <a:rPr lang="fr-FR" sz="2300" dirty="0"/>
+              <a:t>Introduction to Deep Learning</a:t>
+            </a:r>
+          </a:p>
+          <a:p>
+            <a:pPr marL="514350" indent="-514350">
+              <a:lnSpc>
+                <a:spcPct val="110000"/>
+              </a:lnSpc>
+              <a:buFont typeface="+mj-lt"/>
+              <a:buAutoNum type="arabicPeriod"/>
+            </a:pPr>
+            <a:r>
+              <a:rPr lang="fr-FR" sz="2300" dirty="0" err="1"/>
+              <a:t>PyTorch</a:t>
+            </a:r>
+            <a:endParaRPr lang="fr-FR" sz="2300" dirty="0"/>
+          </a:p>
+          <a:p>
+            <a:pPr marL="514350" indent="-514350">
+              <a:lnSpc>
+                <a:spcPct val="110000"/>
+              </a:lnSpc>
+              <a:buFont typeface="+mj-lt"/>
+              <a:buAutoNum type="arabicPeriod"/>
+            </a:pPr>
+            <a:r>
+              <a:rPr lang="en-US" sz="2300" b="1" dirty="0"/>
+              <a:t>Optimizers review. Types of Machine Learning problems and their losses.</a:t>
+            </a:r>
+          </a:p>
+          <a:p>
+            <a:pPr marL="514350" indent="-514350">
+              <a:lnSpc>
+                <a:spcPct val="110000"/>
+              </a:lnSpc>
+              <a:buFont typeface="+mj-lt"/>
+              <a:buAutoNum type="arabicPeriod"/>
+            </a:pPr>
+            <a:r>
+              <a:rPr lang="en-US" sz="2300" dirty="0"/>
+              <a:t>Deep Learning Neural Network Architectures Overview Part. 1</a:t>
+            </a:r>
+          </a:p>
+          <a:p>
+            <a:pPr marL="514350" indent="-514350">
+              <a:lnSpc>
+                <a:spcPct val="110000"/>
+              </a:lnSpc>
+              <a:buFont typeface="+mj-lt"/>
+              <a:buAutoNum type="arabicPeriod"/>
+            </a:pPr>
+            <a:r>
+              <a:rPr lang="en-US" sz="2300" dirty="0"/>
+              <a:t>Deep Learning Neural Network Architectures Overview Part. 2</a:t>
+            </a:r>
+          </a:p>
+          <a:p>
+            <a:pPr marL="514350" indent="-514350">
+              <a:lnSpc>
+                <a:spcPct val="110000"/>
+              </a:lnSpc>
+              <a:buFont typeface="+mj-lt"/>
+              <a:buAutoNum type="arabicPeriod"/>
+            </a:pPr>
+            <a:r>
+              <a:rPr lang="en-US" sz="2300" dirty="0"/>
+              <a:t>Deep Learning Neural Network Architectures Overview Part. 3</a:t>
+            </a:r>
+          </a:p>
+          <a:p>
+            <a:pPr marL="514350" indent="-514350">
+              <a:lnSpc>
+                <a:spcPct val="110000"/>
+              </a:lnSpc>
+              <a:buFont typeface="+mj-lt"/>
+              <a:buAutoNum type="arabicPeriod"/>
+            </a:pPr>
+            <a:r>
+              <a:rPr lang="en-US" sz="2300" dirty="0"/>
+              <a:t>Practical session.</a:t>
+            </a:r>
+          </a:p>
+          <a:p>
+            <a:pPr marL="514350" indent="-514350">
+              <a:lnSpc>
+                <a:spcPct val="110000"/>
+              </a:lnSpc>
+              <a:buFont typeface="+mj-lt"/>
+              <a:buAutoNum type="arabicPeriod"/>
+            </a:pPr>
+            <a:r>
+              <a:rPr lang="en-US" sz="2300" dirty="0"/>
+              <a:t>Transfer Learning. </a:t>
+            </a:r>
+            <a:r>
+              <a:rPr lang="en-US" sz="2300"/>
+              <a:t>Data and gradient subtleties.</a:t>
+            </a:r>
+            <a:endParaRPr lang="en-US" sz="2300" dirty="0"/>
+          </a:p>
+          <a:p>
+            <a:pPr marL="514350" indent="-514350">
+              <a:lnSpc>
+                <a:spcPct val="110000"/>
+              </a:lnSpc>
+              <a:buFont typeface="+mj-lt"/>
+              <a:buAutoNum type="arabicPeriod"/>
+            </a:pPr>
+            <a:r>
+              <a:rPr lang="en-US" sz="2300" dirty="0"/>
+              <a:t>Advanced Deep Learning (Transformers &amp; Stable Diffusion &amp; </a:t>
+            </a:r>
+            <a:r>
+              <a:rPr lang="en-US" sz="2300" dirty="0" err="1"/>
+              <a:t>LoRA</a:t>
+            </a:r>
+            <a:r>
+              <a:rPr lang="en-US" sz="2300" dirty="0"/>
+              <a:t>)</a:t>
+            </a:r>
+          </a:p>
+          <a:p>
+            <a:pPr marL="514350" indent="-514350">
+              <a:lnSpc>
+                <a:spcPct val="110000"/>
+              </a:lnSpc>
+              <a:buFont typeface="+mj-lt"/>
+              <a:buAutoNum type="arabicPeriod"/>
+            </a:pPr>
+            <a:r>
+              <a:rPr lang="en-US" sz="2300" dirty="0"/>
+              <a:t>Exam</a:t>
+            </a:r>
+          </a:p>
+          <a:p>
+            <a:endParaRPr lang="fr-FR" dirty="0"/>
+          </a:p>
+        </p:txBody>
+      </p:sp>
+    </p:spTree>
+    <p:extLst>
+      <p:ext uri="{BB962C8B-B14F-4D97-AF65-F5344CB8AC3E}">
+        <p14:creationId xmlns:p14="http://schemas.microsoft.com/office/powerpoint/2010/main" val="2821173735"/>
+      </p:ext>
+    </p:extLst>
+  </p:cSld>
+  <p:clrMapOvr>
+    <a:masterClrMapping/>
+  </p:clrMapOvr>
+</p:sld>
+</file>
+
+<file path=ppt/slides/slide20.xml><?xml version="1.0" encoding="utf-8"?>
 <p:sld xmlns:a="http://schemas.openxmlformats.org/drawingml/2006/main" xmlns:r="http://schemas.openxmlformats.org/officeDocument/2006/relationships" xmlns:p="http://schemas.openxmlformats.org/presentationml/2006/main">
   <p:cSld>
     <p:spTree>
@@ -9506,323 +9927,7 @@
 </p:sld>
 </file>
 
-<file path=ppt/slides/slide2.xml><?xml version="1.0" encoding="utf-8"?>
-<p:sld xmlns:a="http://schemas.openxmlformats.org/drawingml/2006/main" xmlns:r="http://schemas.openxmlformats.org/officeDocument/2006/relationships" xmlns:p="http://schemas.openxmlformats.org/presentationml/2006/main">
-  <p:cSld>
-    <p:spTree>
-      <p:nvGrpSpPr>
-        <p:cNvPr id="1" name=""/>
-        <p:cNvGrpSpPr/>
-        <p:nvPr/>
-      </p:nvGrpSpPr>
-      <p:grpSpPr>
-        <a:xfrm>
-          <a:off x="0" y="0"/>
-          <a:ext cx="0" cy="0"/>
-          <a:chOff x="0" y="0"/>
-          <a:chExt cx="0" cy="0"/>
-        </a:xfrm>
-      </p:grpSpPr>
-      <p:sp>
-        <p:nvSpPr>
-          <p:cNvPr id="5" name="Title 4">
-            <a:extLst>
-              <a:ext uri="{FF2B5EF4-FFF2-40B4-BE49-F238E27FC236}">
-                <a16:creationId xmlns:a16="http://schemas.microsoft.com/office/drawing/2014/main" id="{64213D2F-A106-3319-AA98-37F0C11F906C}"/>
-              </a:ext>
-            </a:extLst>
-          </p:cNvPr>
-          <p:cNvSpPr>
-            <a:spLocks noGrp="1"/>
-          </p:cNvSpPr>
-          <p:nvPr>
-            <p:ph type="title"/>
-          </p:nvPr>
-        </p:nvSpPr>
-        <p:spPr/>
-        <p:txBody>
-          <a:bodyPr/>
-          <a:lstStyle/>
-          <a:p>
-            <a:r>
-              <a:rPr lang="en-US" dirty="0"/>
-              <a:t>Optimizers’ review</a:t>
-            </a:r>
-          </a:p>
-        </p:txBody>
-      </p:sp>
-      <p:sp>
-        <p:nvSpPr>
-          <p:cNvPr id="6" name="Content Placeholder 5">
-            <a:extLst>
-              <a:ext uri="{FF2B5EF4-FFF2-40B4-BE49-F238E27FC236}">
-                <a16:creationId xmlns:a16="http://schemas.microsoft.com/office/drawing/2014/main" id="{3C4EB284-4A7B-E6BB-BEC1-67954B65026D}"/>
-              </a:ext>
-            </a:extLst>
-          </p:cNvPr>
-          <p:cNvSpPr>
-            <a:spLocks noGrp="1"/>
-          </p:cNvSpPr>
-          <p:nvPr>
-            <p:ph idx="1"/>
-          </p:nvPr>
-        </p:nvSpPr>
-        <p:spPr/>
-        <p:txBody>
-          <a:bodyPr>
-            <a:normAutofit lnSpcReduction="10000"/>
-          </a:bodyPr>
-          <a:lstStyle/>
-          <a:p>
-            <a:pPr algn="just"/>
-            <a:r>
-              <a:rPr lang="en-US" dirty="0"/>
-              <a:t>Reminders:</a:t>
-            </a:r>
-          </a:p>
-          <a:p>
-            <a:pPr lvl="1" algn="just"/>
-            <a:r>
-              <a:rPr lang="en-US" b="0" i="0" dirty="0">
-                <a:effectLst/>
-                <a:latin typeface="-apple-system"/>
-              </a:rPr>
-              <a:t>Backpropagation -&gt; algorithm which computes the gradient of the parameters within a neural network with respect to the loss. </a:t>
-            </a:r>
-          </a:p>
-          <a:p>
-            <a:pPr lvl="1" algn="just"/>
-            <a:r>
-              <a:rPr lang="en-US" b="0" i="0" dirty="0">
-                <a:effectLst/>
-                <a:latin typeface="-apple-system"/>
-              </a:rPr>
-              <a:t>Gradient descent optimization algorithms -&gt; take that gradient for each parameter and use it to figure out how it should update </a:t>
-            </a:r>
-            <a:r>
-              <a:rPr lang="en-US" dirty="0">
-                <a:latin typeface="-apple-system"/>
-              </a:rPr>
-              <a:t>the parameter </a:t>
-            </a:r>
-            <a:r>
-              <a:rPr lang="en-US" b="0" i="0" dirty="0">
-                <a:effectLst/>
-                <a:latin typeface="-apple-system"/>
-              </a:rPr>
-              <a:t>to reduce the loss.</a:t>
-            </a:r>
-          </a:p>
-          <a:p>
-            <a:pPr algn="just"/>
-            <a:r>
-              <a:rPr lang="en-US" dirty="0"/>
-              <a:t>Choosing the optimizer is considered to be among the most crucial design decisions in deep learning (reminder: we consider the optimizer as a hyperparameter (and similarly its parameters (</a:t>
-            </a:r>
-            <a:r>
-              <a:rPr lang="en-US" dirty="0" err="1"/>
-              <a:t>learning_rate</a:t>
-            </a:r>
-            <a:r>
-              <a:rPr lang="en-US" dirty="0"/>
-              <a:t>, </a:t>
-            </a:r>
-            <a:r>
-              <a:rPr lang="en-US" dirty="0" err="1"/>
-              <a:t>etc</a:t>
-            </a:r>
-            <a:r>
-              <a:rPr lang="en-US" dirty="0"/>
-              <a:t> …) are considered as hyperparameters)).</a:t>
-            </a:r>
-          </a:p>
-          <a:p>
-            <a:pPr algn="just"/>
-            <a:r>
-              <a:rPr lang="en-US" dirty="0"/>
-              <a:t>But the growing literature now lists hundreds of optimization methods.</a:t>
-            </a:r>
-          </a:p>
-        </p:txBody>
-      </p:sp>
-    </p:spTree>
-    <p:extLst>
-      <p:ext uri="{BB962C8B-B14F-4D97-AF65-F5344CB8AC3E}">
-        <p14:creationId xmlns:p14="http://schemas.microsoft.com/office/powerpoint/2010/main" val="2162909334"/>
-      </p:ext>
-    </p:extLst>
-  </p:cSld>
-  <p:clrMapOvr>
-    <a:masterClrMapping/>
-  </p:clrMapOvr>
-  <mc:AlternateContent xmlns:mc="http://schemas.openxmlformats.org/markup-compatibility/2006" xmlns:p14="http://schemas.microsoft.com/office/powerpoint/2010/main">
-    <mc:Choice Requires="p14">
-      <p:transition spd="med" p14:dur="700">
-        <p:fade/>
-      </p:transition>
-    </mc:Choice>
-    <mc:Fallback xmlns="">
-      <p:transition spd="med">
-        <p:fade/>
-      </p:transition>
-    </mc:Fallback>
-  </mc:AlternateContent>
-  <p:timing>
-    <p:tnLst>
-      <p:par>
-        <p:cTn id="1" dur="indefinite" restart="never" nodeType="tmRoot">
-          <p:childTnLst>
-            <p:seq concurrent="1" nextAc="seek">
-              <p:cTn id="2" dur="indefinite" nodeType="mainSeq">
-                <p:childTnLst>
-                  <p:par>
-                    <p:cTn id="3" fill="hold">
-                      <p:stCondLst>
-                        <p:cond delay="indefinite"/>
-                      </p:stCondLst>
-                      <p:childTnLst>
-                        <p:par>
-                          <p:cTn id="4" fill="hold">
-                            <p:stCondLst>
-                              <p:cond delay="0"/>
-                            </p:stCondLst>
-                            <p:childTnLst>
-                              <p:par>
-                                <p:cTn id="5" presetID="10" presetClass="entr" presetSubtype="0" fill="hold" nodeType="clickEffect">
-                                  <p:stCondLst>
-                                    <p:cond delay="0"/>
-                                  </p:stCondLst>
-                                  <p:childTnLst>
-                                    <p:set>
-                                      <p:cBhvr>
-                                        <p:cTn id="6" dur="1" fill="hold">
-                                          <p:stCondLst>
-                                            <p:cond delay="0"/>
-                                          </p:stCondLst>
-                                        </p:cTn>
-                                        <p:tgtEl>
-                                          <p:spTgt spid="6">
-                                            <p:txEl>
-                                              <p:pRg st="3" end="3"/>
-                                            </p:txEl>
-                                          </p:spTgt>
-                                        </p:tgtEl>
-                                        <p:attrNameLst>
-                                          <p:attrName>style.visibility</p:attrName>
-                                        </p:attrNameLst>
-                                      </p:cBhvr>
-                                      <p:to>
-                                        <p:strVal val="visible"/>
-                                      </p:to>
-                                    </p:set>
-                                    <p:animEffect transition="in" filter="fade">
-                                      <p:cBhvr>
-                                        <p:cTn id="7" dur="500"/>
-                                        <p:tgtEl>
-                                          <p:spTgt spid="6">
-                                            <p:txEl>
-                                              <p:pRg st="3" end="3"/>
-                                            </p:txEl>
-                                          </p:spTgt>
-                                        </p:tgtEl>
-                                      </p:cBhvr>
-                                    </p:animEffect>
-                                  </p:childTnLst>
-                                </p:cTn>
-                              </p:par>
-                            </p:childTnLst>
-                          </p:cTn>
-                        </p:par>
-                      </p:childTnLst>
-                    </p:cTn>
-                  </p:par>
-                  <p:par>
-                    <p:cTn id="8" fill="hold">
-                      <p:stCondLst>
-                        <p:cond delay="indefinite"/>
-                      </p:stCondLst>
-                      <p:childTnLst>
-                        <p:par>
-                          <p:cTn id="9" fill="hold">
-                            <p:stCondLst>
-                              <p:cond delay="0"/>
-                            </p:stCondLst>
-                            <p:childTnLst>
-                              <p:par>
-                                <p:cTn id="10" presetID="10" presetClass="entr" presetSubtype="0" fill="hold" nodeType="clickEffect">
-                                  <p:stCondLst>
-                                    <p:cond delay="0"/>
-                                  </p:stCondLst>
-                                  <p:childTnLst>
-                                    <p:set>
-                                      <p:cBhvr>
-                                        <p:cTn id="11" dur="1" fill="hold">
-                                          <p:stCondLst>
-                                            <p:cond delay="0"/>
-                                          </p:stCondLst>
-                                        </p:cTn>
-                                        <p:tgtEl>
-                                          <p:spTgt spid="6">
-                                            <p:txEl>
-                                              <p:pRg st="4" end="4"/>
-                                            </p:txEl>
-                                          </p:spTgt>
-                                        </p:tgtEl>
-                                        <p:attrNameLst>
-                                          <p:attrName>style.visibility</p:attrName>
-                                        </p:attrNameLst>
-                                      </p:cBhvr>
-                                      <p:to>
-                                        <p:strVal val="visible"/>
-                                      </p:to>
-                                    </p:set>
-                                    <p:animEffect transition="in" filter="fade">
-                                      <p:cBhvr>
-                                        <p:cTn id="12" dur="500"/>
-                                        <p:tgtEl>
-                                          <p:spTgt spid="6">
-                                            <p:txEl>
-                                              <p:pRg st="4" end="4"/>
-                                            </p:txEl>
-                                          </p:spTgt>
-                                        </p:tgtEl>
-                                      </p:cBhvr>
-                                    </p:animEffect>
-                                  </p:childTnLst>
-                                </p:cTn>
-                              </p:par>
-                            </p:childTnLst>
-                          </p:cTn>
-                        </p:par>
-                      </p:childTnLst>
-                    </p:cTn>
-                  </p:par>
-                </p:childTnLst>
-              </p:cTn>
-              <p:prevCondLst>
-                <p:cond evt="onPrev" delay="0">
-                  <p:tgtEl>
-                    <p:sldTgt/>
-                  </p:tgtEl>
-                </p:cond>
-              </p:prevCondLst>
-              <p:nextCondLst>
-                <p:cond evt="onNext" delay="0">
-                  <p:tgtEl>
-                    <p:sldTgt/>
-                  </p:tgtEl>
-                </p:cond>
-              </p:nextCondLst>
-            </p:seq>
-          </p:childTnLst>
-        </p:cTn>
-      </p:par>
-    </p:tnLst>
-  </p:timing>
-</p:sld>
-</file>
-
-<file path=ppt/slides/slide20.xml><?xml version="1.0" encoding="utf-8"?>
+<file path=ppt/slides/slide21.xml><?xml version="1.0" encoding="utf-8"?>
 <p:sld xmlns:a="http://schemas.openxmlformats.org/drawingml/2006/main" xmlns:r="http://schemas.openxmlformats.org/officeDocument/2006/relationships" xmlns:p="http://schemas.openxmlformats.org/presentationml/2006/main">
   <p:cSld>
     <p:spTree>
@@ -10608,7 +10713,7 @@
 </p:sld>
 </file>
 
-<file path=ppt/slides/slide21.xml><?xml version="1.0" encoding="utf-8"?>
+<file path=ppt/slides/slide22.xml><?xml version="1.0" encoding="utf-8"?>
 <p:sld xmlns:a="http://schemas.openxmlformats.org/drawingml/2006/main" xmlns:r="http://schemas.openxmlformats.org/officeDocument/2006/relationships" xmlns:p="http://schemas.openxmlformats.org/presentationml/2006/main">
   <p:cSld>
     <p:spTree>
@@ -10980,7 +11085,7 @@
 </p:sld>
 </file>
 
-<file path=ppt/slides/slide22.xml><?xml version="1.0" encoding="utf-8"?>
+<file path=ppt/slides/slide23.xml><?xml version="1.0" encoding="utf-8"?>
 <p:sld xmlns:a="http://schemas.openxmlformats.org/drawingml/2006/main" xmlns:r="http://schemas.openxmlformats.org/officeDocument/2006/relationships" xmlns:p="http://schemas.openxmlformats.org/presentationml/2006/main">
   <p:cSld>
     <p:spTree>
@@ -12074,7 +12179,7 @@
 </p:sld>
 </file>
 
-<file path=ppt/slides/slide23.xml><?xml version="1.0" encoding="utf-8"?>
+<file path=ppt/slides/slide24.xml><?xml version="1.0" encoding="utf-8"?>
 <p:sld xmlns:a="http://schemas.openxmlformats.org/drawingml/2006/main" xmlns:r="http://schemas.openxmlformats.org/officeDocument/2006/relationships" xmlns:p="http://schemas.openxmlformats.org/presentationml/2006/main">
   <p:cSld>
     <p:spTree>
@@ -12240,7 +12345,7 @@
 </p:sld>
 </file>
 
-<file path=ppt/slides/slide24.xml><?xml version="1.0" encoding="utf-8"?>
+<file path=ppt/slides/slide25.xml><?xml version="1.0" encoding="utf-8"?>
 <p:sld xmlns:a="http://schemas.openxmlformats.org/drawingml/2006/main" xmlns:r="http://schemas.openxmlformats.org/officeDocument/2006/relationships" xmlns:p="http://schemas.openxmlformats.org/presentationml/2006/main">
   <p:cSld>
     <p:spTree>
@@ -12632,6 +12737,322 @@
 </file>
 
 <file path=ppt/slides/slide3.xml><?xml version="1.0" encoding="utf-8"?>
+<p:sld xmlns:a="http://schemas.openxmlformats.org/drawingml/2006/main" xmlns:r="http://schemas.openxmlformats.org/officeDocument/2006/relationships" xmlns:p="http://schemas.openxmlformats.org/presentationml/2006/main">
+  <p:cSld>
+    <p:spTree>
+      <p:nvGrpSpPr>
+        <p:cNvPr id="1" name=""/>
+        <p:cNvGrpSpPr/>
+        <p:nvPr/>
+      </p:nvGrpSpPr>
+      <p:grpSpPr>
+        <a:xfrm>
+          <a:off x="0" y="0"/>
+          <a:ext cx="0" cy="0"/>
+          <a:chOff x="0" y="0"/>
+          <a:chExt cx="0" cy="0"/>
+        </a:xfrm>
+      </p:grpSpPr>
+      <p:sp>
+        <p:nvSpPr>
+          <p:cNvPr id="5" name="Title 4">
+            <a:extLst>
+              <a:ext uri="{FF2B5EF4-FFF2-40B4-BE49-F238E27FC236}">
+                <a16:creationId xmlns:a16="http://schemas.microsoft.com/office/drawing/2014/main" id="{64213D2F-A106-3319-AA98-37F0C11F906C}"/>
+              </a:ext>
+            </a:extLst>
+          </p:cNvPr>
+          <p:cNvSpPr>
+            <a:spLocks noGrp="1"/>
+          </p:cNvSpPr>
+          <p:nvPr>
+            <p:ph type="title"/>
+          </p:nvPr>
+        </p:nvSpPr>
+        <p:spPr/>
+        <p:txBody>
+          <a:bodyPr/>
+          <a:lstStyle/>
+          <a:p>
+            <a:r>
+              <a:rPr lang="en-US" dirty="0"/>
+              <a:t>Optimizers’ review</a:t>
+            </a:r>
+          </a:p>
+        </p:txBody>
+      </p:sp>
+      <p:sp>
+        <p:nvSpPr>
+          <p:cNvPr id="6" name="Content Placeholder 5">
+            <a:extLst>
+              <a:ext uri="{FF2B5EF4-FFF2-40B4-BE49-F238E27FC236}">
+                <a16:creationId xmlns:a16="http://schemas.microsoft.com/office/drawing/2014/main" id="{3C4EB284-4A7B-E6BB-BEC1-67954B65026D}"/>
+              </a:ext>
+            </a:extLst>
+          </p:cNvPr>
+          <p:cNvSpPr>
+            <a:spLocks noGrp="1"/>
+          </p:cNvSpPr>
+          <p:nvPr>
+            <p:ph idx="1"/>
+          </p:nvPr>
+        </p:nvSpPr>
+        <p:spPr/>
+        <p:txBody>
+          <a:bodyPr>
+            <a:normAutofit lnSpcReduction="10000"/>
+          </a:bodyPr>
+          <a:lstStyle/>
+          <a:p>
+            <a:pPr algn="just"/>
+            <a:r>
+              <a:rPr lang="en-US" dirty="0"/>
+              <a:t>Reminders:</a:t>
+            </a:r>
+          </a:p>
+          <a:p>
+            <a:pPr lvl="1" algn="just"/>
+            <a:r>
+              <a:rPr lang="en-US" b="0" i="0" dirty="0">
+                <a:effectLst/>
+                <a:latin typeface="-apple-system"/>
+              </a:rPr>
+              <a:t>Backpropagation -&gt; algorithm which computes the gradient of the parameters within a neural network with respect to the loss. </a:t>
+            </a:r>
+          </a:p>
+          <a:p>
+            <a:pPr lvl="1" algn="just"/>
+            <a:r>
+              <a:rPr lang="en-US" b="0" i="0" dirty="0">
+                <a:effectLst/>
+                <a:latin typeface="-apple-system"/>
+              </a:rPr>
+              <a:t>Gradient descent optimization algorithms -&gt; take that gradient for each parameter and use it to figure out how it should update </a:t>
+            </a:r>
+            <a:r>
+              <a:rPr lang="en-US" dirty="0">
+                <a:latin typeface="-apple-system"/>
+              </a:rPr>
+              <a:t>the parameter </a:t>
+            </a:r>
+            <a:r>
+              <a:rPr lang="en-US" b="0" i="0" dirty="0">
+                <a:effectLst/>
+                <a:latin typeface="-apple-system"/>
+              </a:rPr>
+              <a:t>to reduce the loss.</a:t>
+            </a:r>
+          </a:p>
+          <a:p>
+            <a:pPr algn="just"/>
+            <a:r>
+              <a:rPr lang="en-US" dirty="0"/>
+              <a:t>Choosing the optimizer is considered to be among the most crucial design decisions in deep learning (reminder: we consider the optimizer as a hyperparameter (and similarly its parameters (</a:t>
+            </a:r>
+            <a:r>
+              <a:rPr lang="en-US" dirty="0" err="1"/>
+              <a:t>learning_rate</a:t>
+            </a:r>
+            <a:r>
+              <a:rPr lang="en-US" dirty="0"/>
+              <a:t>, </a:t>
+            </a:r>
+            <a:r>
+              <a:rPr lang="en-US" dirty="0" err="1"/>
+              <a:t>etc</a:t>
+            </a:r>
+            <a:r>
+              <a:rPr lang="en-US" dirty="0"/>
+              <a:t> …) are considered as hyperparameters)).</a:t>
+            </a:r>
+          </a:p>
+          <a:p>
+            <a:pPr algn="just"/>
+            <a:r>
+              <a:rPr lang="en-US" dirty="0"/>
+              <a:t>But the growing literature now lists hundreds of optimization methods.</a:t>
+            </a:r>
+          </a:p>
+        </p:txBody>
+      </p:sp>
+    </p:spTree>
+    <p:extLst>
+      <p:ext uri="{BB962C8B-B14F-4D97-AF65-F5344CB8AC3E}">
+        <p14:creationId xmlns:p14="http://schemas.microsoft.com/office/powerpoint/2010/main" val="2162909334"/>
+      </p:ext>
+    </p:extLst>
+  </p:cSld>
+  <p:clrMapOvr>
+    <a:masterClrMapping/>
+  </p:clrMapOvr>
+  <mc:AlternateContent xmlns:mc="http://schemas.openxmlformats.org/markup-compatibility/2006" xmlns:p14="http://schemas.microsoft.com/office/powerpoint/2010/main">
+    <mc:Choice Requires="p14">
+      <p:transition spd="med" p14:dur="700">
+        <p:fade/>
+      </p:transition>
+    </mc:Choice>
+    <mc:Fallback xmlns="">
+      <p:transition spd="med">
+        <p:fade/>
+      </p:transition>
+    </mc:Fallback>
+  </mc:AlternateContent>
+  <p:timing>
+    <p:tnLst>
+      <p:par>
+        <p:cTn id="1" dur="indefinite" restart="never" nodeType="tmRoot">
+          <p:childTnLst>
+            <p:seq concurrent="1" nextAc="seek">
+              <p:cTn id="2" dur="indefinite" nodeType="mainSeq">
+                <p:childTnLst>
+                  <p:par>
+                    <p:cTn id="3" fill="hold">
+                      <p:stCondLst>
+                        <p:cond delay="indefinite"/>
+                      </p:stCondLst>
+                      <p:childTnLst>
+                        <p:par>
+                          <p:cTn id="4" fill="hold">
+                            <p:stCondLst>
+                              <p:cond delay="0"/>
+                            </p:stCondLst>
+                            <p:childTnLst>
+                              <p:par>
+                                <p:cTn id="5" presetID="10" presetClass="entr" presetSubtype="0" fill="hold" nodeType="clickEffect">
+                                  <p:stCondLst>
+                                    <p:cond delay="0"/>
+                                  </p:stCondLst>
+                                  <p:childTnLst>
+                                    <p:set>
+                                      <p:cBhvr>
+                                        <p:cTn id="6" dur="1" fill="hold">
+                                          <p:stCondLst>
+                                            <p:cond delay="0"/>
+                                          </p:stCondLst>
+                                        </p:cTn>
+                                        <p:tgtEl>
+                                          <p:spTgt spid="6">
+                                            <p:txEl>
+                                              <p:pRg st="3" end="3"/>
+                                            </p:txEl>
+                                          </p:spTgt>
+                                        </p:tgtEl>
+                                        <p:attrNameLst>
+                                          <p:attrName>style.visibility</p:attrName>
+                                        </p:attrNameLst>
+                                      </p:cBhvr>
+                                      <p:to>
+                                        <p:strVal val="visible"/>
+                                      </p:to>
+                                    </p:set>
+                                    <p:animEffect transition="in" filter="fade">
+                                      <p:cBhvr>
+                                        <p:cTn id="7" dur="500"/>
+                                        <p:tgtEl>
+                                          <p:spTgt spid="6">
+                                            <p:txEl>
+                                              <p:pRg st="3" end="3"/>
+                                            </p:txEl>
+                                          </p:spTgt>
+                                        </p:tgtEl>
+                                      </p:cBhvr>
+                                    </p:animEffect>
+                                  </p:childTnLst>
+                                </p:cTn>
+                              </p:par>
+                            </p:childTnLst>
+                          </p:cTn>
+                        </p:par>
+                      </p:childTnLst>
+                    </p:cTn>
+                  </p:par>
+                  <p:par>
+                    <p:cTn id="8" fill="hold">
+                      <p:stCondLst>
+                        <p:cond delay="indefinite"/>
+                      </p:stCondLst>
+                      <p:childTnLst>
+                        <p:par>
+                          <p:cTn id="9" fill="hold">
+                            <p:stCondLst>
+                              <p:cond delay="0"/>
+                            </p:stCondLst>
+                            <p:childTnLst>
+                              <p:par>
+                                <p:cTn id="10" presetID="10" presetClass="entr" presetSubtype="0" fill="hold" nodeType="clickEffect">
+                                  <p:stCondLst>
+                                    <p:cond delay="0"/>
+                                  </p:stCondLst>
+                                  <p:childTnLst>
+                                    <p:set>
+                                      <p:cBhvr>
+                                        <p:cTn id="11" dur="1" fill="hold">
+                                          <p:stCondLst>
+                                            <p:cond delay="0"/>
+                                          </p:stCondLst>
+                                        </p:cTn>
+                                        <p:tgtEl>
+                                          <p:spTgt spid="6">
+                                            <p:txEl>
+                                              <p:pRg st="4" end="4"/>
+                                            </p:txEl>
+                                          </p:spTgt>
+                                        </p:tgtEl>
+                                        <p:attrNameLst>
+                                          <p:attrName>style.visibility</p:attrName>
+                                        </p:attrNameLst>
+                                      </p:cBhvr>
+                                      <p:to>
+                                        <p:strVal val="visible"/>
+                                      </p:to>
+                                    </p:set>
+                                    <p:animEffect transition="in" filter="fade">
+                                      <p:cBhvr>
+                                        <p:cTn id="12" dur="500"/>
+                                        <p:tgtEl>
+                                          <p:spTgt spid="6">
+                                            <p:txEl>
+                                              <p:pRg st="4" end="4"/>
+                                            </p:txEl>
+                                          </p:spTgt>
+                                        </p:tgtEl>
+                                      </p:cBhvr>
+                                    </p:animEffect>
+                                  </p:childTnLst>
+                                </p:cTn>
+                              </p:par>
+                            </p:childTnLst>
+                          </p:cTn>
+                        </p:par>
+                      </p:childTnLst>
+                    </p:cTn>
+                  </p:par>
+                </p:childTnLst>
+              </p:cTn>
+              <p:prevCondLst>
+                <p:cond evt="onPrev" delay="0">
+                  <p:tgtEl>
+                    <p:sldTgt/>
+                  </p:tgtEl>
+                </p:cond>
+              </p:prevCondLst>
+              <p:nextCondLst>
+                <p:cond evt="onNext" delay="0">
+                  <p:tgtEl>
+                    <p:sldTgt/>
+                  </p:tgtEl>
+                </p:cond>
+              </p:nextCondLst>
+            </p:seq>
+          </p:childTnLst>
+        </p:cTn>
+      </p:par>
+    </p:tnLst>
+  </p:timing>
+</p:sld>
+</file>
+
+<file path=ppt/slides/slide4.xml><?xml version="1.0" encoding="utf-8"?>
 <p:sld xmlns:a="http://schemas.openxmlformats.org/drawingml/2006/main" xmlns:r="http://schemas.openxmlformats.org/officeDocument/2006/relationships" xmlns:p="http://schemas.openxmlformats.org/presentationml/2006/main">
   <p:cSld>
     <p:spTree>
@@ -12883,7 +13304,7 @@
 </p:sld>
 </file>
 
-<file path=ppt/slides/slide4.xml><?xml version="1.0" encoding="utf-8"?>
+<file path=ppt/slides/slide5.xml><?xml version="1.0" encoding="utf-8"?>
 <p:sld xmlns:a="http://schemas.openxmlformats.org/drawingml/2006/main" xmlns:r="http://schemas.openxmlformats.org/officeDocument/2006/relationships" xmlns:p="http://schemas.openxmlformats.org/presentationml/2006/main">
   <p:cSld>
     <p:spTree>
@@ -13017,7 +13438,7 @@
 </p:sld>
 </file>
 
-<file path=ppt/slides/slide5.xml><?xml version="1.0" encoding="utf-8"?>
+<file path=ppt/slides/slide6.xml><?xml version="1.0" encoding="utf-8"?>
 <p:sld xmlns:a="http://schemas.openxmlformats.org/drawingml/2006/main" xmlns:r="http://schemas.openxmlformats.org/officeDocument/2006/relationships" xmlns:p="http://schemas.openxmlformats.org/presentationml/2006/main">
   <p:cSld>
     <p:spTree>
@@ -14492,7 +14913,7 @@
 </p:sld>
 </file>
 
-<file path=ppt/slides/slide6.xml><?xml version="1.0" encoding="utf-8"?>
+<file path=ppt/slides/slide7.xml><?xml version="1.0" encoding="utf-8"?>
 <p:sld xmlns:a="http://schemas.openxmlformats.org/drawingml/2006/main" xmlns:r="http://schemas.openxmlformats.org/officeDocument/2006/relationships" xmlns:p="http://schemas.openxmlformats.org/presentationml/2006/main">
   <p:cSld>
     <p:spTree>
@@ -15871,7 +16292,7 @@
 </p:sld>
 </file>
 
-<file path=ppt/slides/slide7.xml><?xml version="1.0" encoding="utf-8"?>
+<file path=ppt/slides/slide8.xml><?xml version="1.0" encoding="utf-8"?>
 <p:sld xmlns:a="http://schemas.openxmlformats.org/drawingml/2006/main" xmlns:r="http://schemas.openxmlformats.org/officeDocument/2006/relationships" xmlns:p="http://schemas.openxmlformats.org/presentationml/2006/main">
   <p:cSld>
     <p:spTree>
@@ -16005,7 +16426,7 @@
 </p:sld>
 </file>
 
-<file path=ppt/slides/slide8.xml><?xml version="1.0" encoding="utf-8"?>
+<file path=ppt/slides/slide9.xml><?xml version="1.0" encoding="utf-8"?>
 <p:sld xmlns:a="http://schemas.openxmlformats.org/drawingml/2006/main" xmlns:r="http://schemas.openxmlformats.org/officeDocument/2006/relationships" xmlns:p="http://schemas.openxmlformats.org/presentationml/2006/main">
   <p:cSld>
     <p:spTree>
@@ -16635,188 +17056,6 @@
       </p:par>
     </p:tnLst>
   </p:timing>
-</p:sld>
-</file>
-
-<file path=ppt/slides/slide9.xml><?xml version="1.0" encoding="utf-8"?>
-<p:sld xmlns:a="http://schemas.openxmlformats.org/drawingml/2006/main" xmlns:r="http://schemas.openxmlformats.org/officeDocument/2006/relationships" xmlns:p="http://schemas.openxmlformats.org/presentationml/2006/main">
-  <p:cSld>
-    <p:spTree>
-      <p:nvGrpSpPr>
-        <p:cNvPr id="1" name=""/>
-        <p:cNvGrpSpPr/>
-        <p:nvPr/>
-      </p:nvGrpSpPr>
-      <p:grpSpPr>
-        <a:xfrm>
-          <a:off x="0" y="0"/>
-          <a:ext cx="0" cy="0"/>
-          <a:chOff x="0" y="0"/>
-          <a:chExt cx="0" cy="0"/>
-        </a:xfrm>
-      </p:grpSpPr>
-      <p:sp>
-        <p:nvSpPr>
-          <p:cNvPr id="5" name="Title 4">
-            <a:extLst>
-              <a:ext uri="{FF2B5EF4-FFF2-40B4-BE49-F238E27FC236}">
-                <a16:creationId xmlns:a16="http://schemas.microsoft.com/office/drawing/2014/main" id="{64213D2F-A106-3319-AA98-37F0C11F906C}"/>
-              </a:ext>
-            </a:extLst>
-          </p:cNvPr>
-          <p:cNvSpPr>
-            <a:spLocks noGrp="1"/>
-          </p:cNvSpPr>
-          <p:nvPr>
-            <p:ph type="title"/>
-          </p:nvPr>
-        </p:nvSpPr>
-        <p:spPr/>
-        <p:txBody>
-          <a:bodyPr/>
-          <a:lstStyle/>
-          <a:p>
-            <a:r>
-              <a:rPr lang="en-US" dirty="0"/>
-              <a:t>Learning </a:t>
-            </a:r>
-            <a:r>
-              <a:rPr lang="en-US"/>
-              <a:t>rate scheduling</a:t>
-            </a:r>
-            <a:endParaRPr lang="en-US" dirty="0"/>
-          </a:p>
-        </p:txBody>
-      </p:sp>
-      <p:pic>
-        <p:nvPicPr>
-          <p:cNvPr id="7" name="Picture 6">
-            <a:extLst>
-              <a:ext uri="{FF2B5EF4-FFF2-40B4-BE49-F238E27FC236}">
-                <a16:creationId xmlns:a16="http://schemas.microsoft.com/office/drawing/2014/main" id="{9882887F-2359-65FC-4040-10214D45762A}"/>
-              </a:ext>
-            </a:extLst>
-          </p:cNvPr>
-          <p:cNvPicPr>
-            <a:picLocks noChangeAspect="1"/>
-          </p:cNvPicPr>
-          <p:nvPr/>
-        </p:nvPicPr>
-        <p:blipFill>
-          <a:blip r:embed="rId3"/>
-          <a:stretch>
-            <a:fillRect/>
-          </a:stretch>
-        </p:blipFill>
-        <p:spPr>
-          <a:xfrm>
-            <a:off x="1050468" y="1830133"/>
-            <a:ext cx="9605242" cy="3813847"/>
-          </a:xfrm>
-          <a:prstGeom prst="rect">
-            <a:avLst/>
-          </a:prstGeom>
-        </p:spPr>
-      </p:pic>
-      <p:sp>
-        <p:nvSpPr>
-          <p:cNvPr id="8" name="Rectangle 7">
-            <a:extLst>
-              <a:ext uri="{FF2B5EF4-FFF2-40B4-BE49-F238E27FC236}">
-                <a16:creationId xmlns:a16="http://schemas.microsoft.com/office/drawing/2014/main" id="{DF8F17C0-85F0-1605-7332-6617921D4CA2}"/>
-              </a:ext>
-            </a:extLst>
-          </p:cNvPr>
-          <p:cNvSpPr/>
-          <p:nvPr/>
-        </p:nvSpPr>
-        <p:spPr>
-          <a:xfrm>
-            <a:off x="7643813" y="1830133"/>
-            <a:ext cx="2133599" cy="315757"/>
-          </a:xfrm>
-          <a:prstGeom prst="rect">
-            <a:avLst/>
-          </a:prstGeom>
-          <a:solidFill>
-            <a:schemeClr val="bg1"/>
-          </a:solidFill>
-          <a:ln>
-            <a:solidFill>
-              <a:schemeClr val="bg1"/>
-            </a:solidFill>
-          </a:ln>
-        </p:spPr>
-        <p:style>
-          <a:lnRef idx="2">
-            <a:schemeClr val="accent1">
-              <a:shade val="50000"/>
-            </a:schemeClr>
-          </a:lnRef>
-          <a:fillRef idx="1">
-            <a:schemeClr val="accent1"/>
-          </a:fillRef>
-          <a:effectRef idx="0">
-            <a:schemeClr val="accent1"/>
-          </a:effectRef>
-          <a:fontRef idx="minor">
-            <a:schemeClr val="lt1"/>
-          </a:fontRef>
-        </p:style>
-        <p:txBody>
-          <a:bodyPr rtlCol="0" anchor="ctr"/>
-          <a:lstStyle/>
-          <a:p>
-            <a:pPr algn="ctr"/>
-            <a:r>
-              <a:rPr lang="fr-FR" sz="1600" dirty="0">
-                <a:solidFill>
-                  <a:schemeClr val="tx1"/>
-                </a:solidFill>
-              </a:rPr>
-              <a:t>Constant </a:t>
-            </a:r>
-            <a:r>
-              <a:rPr lang="fr-FR" sz="1600" dirty="0" err="1">
-                <a:solidFill>
-                  <a:schemeClr val="tx1"/>
-                </a:solidFill>
-              </a:rPr>
-              <a:t>learning</a:t>
-            </a:r>
-            <a:r>
-              <a:rPr lang="fr-FR" sz="1600" dirty="0">
-                <a:solidFill>
-                  <a:schemeClr val="tx1"/>
-                </a:solidFill>
-              </a:rPr>
-              <a:t> rate</a:t>
-            </a:r>
-          </a:p>
-        </p:txBody>
-      </p:sp>
-    </p:spTree>
-    <p:extLst>
-      <p:ext uri="{BB962C8B-B14F-4D97-AF65-F5344CB8AC3E}">
-        <p14:creationId xmlns:p14="http://schemas.microsoft.com/office/powerpoint/2010/main" val="1110710355"/>
-      </p:ext>
-    </p:extLst>
-  </p:cSld>
-  <p:clrMapOvr>
-    <a:masterClrMapping/>
-  </p:clrMapOvr>
-  <mc:AlternateContent xmlns:mc="http://schemas.openxmlformats.org/markup-compatibility/2006" xmlns:p14="http://schemas.microsoft.com/office/powerpoint/2010/main">
-    <mc:Choice Requires="p14">
-      <p:transition spd="med" p14:dur="700">
-        <p:fade/>
-      </p:transition>
-    </mc:Choice>
-    <mc:Fallback xmlns="">
-      <p:transition spd="med">
-        <p:fade/>
-      </p:transition>
-    </mc:Fallback>
-  </mc:AlternateContent>
 </p:sld>
 </file>
 

</xml_diff>

<commit_message>
Added Template for Project. Updated Slides 3 Syllabus
Signed-off-by: JasonMendoza2008 <lhotteromain@gmail.com>
</commit_message>
<xml_diff>
--- a/Slides/Slides_3.pptx
+++ b/Slides/Slides_3.pptx
@@ -744,7 +744,7 @@
           <a:p>
             <a:fld id="{207C662F-A001-4EA2-B345-C237CD6465E1}" type="datetimeFigureOut">
               <a:rPr lang="en-US" smtClean="0"/>
-              <a:t>1/13/2025</a:t>
+              <a:t>1/21/2025</a:t>
             </a:fld>
             <a:endParaRPr lang="en-US"/>
           </a:p>
@@ -3653,7 +3653,7 @@
           <a:p>
             <a:fld id="{4F06803B-D602-4C3D-AD5C-468F46C70933}" type="datetimeFigureOut">
               <a:rPr lang="en-US" smtClean="0"/>
-              <a:t>1/13/2025</a:t>
+              <a:t>1/21/2025</a:t>
             </a:fld>
             <a:endParaRPr lang="en-US"/>
           </a:p>
@@ -3851,7 +3851,7 @@
           <a:p>
             <a:fld id="{4F06803B-D602-4C3D-AD5C-468F46C70933}" type="datetimeFigureOut">
               <a:rPr lang="en-US" smtClean="0"/>
-              <a:t>1/13/2025</a:t>
+              <a:t>1/21/2025</a:t>
             </a:fld>
             <a:endParaRPr lang="en-US"/>
           </a:p>
@@ -4059,7 +4059,7 @@
           <a:p>
             <a:fld id="{4F06803B-D602-4C3D-AD5C-468F46C70933}" type="datetimeFigureOut">
               <a:rPr lang="en-US" smtClean="0"/>
-              <a:t>1/13/2025</a:t>
+              <a:t>1/21/2025</a:t>
             </a:fld>
             <a:endParaRPr lang="en-US"/>
           </a:p>
@@ -4257,7 +4257,7 @@
           <a:p>
             <a:fld id="{4F06803B-D602-4C3D-AD5C-468F46C70933}" type="datetimeFigureOut">
               <a:rPr lang="en-US" smtClean="0"/>
-              <a:t>1/13/2025</a:t>
+              <a:t>1/21/2025</a:t>
             </a:fld>
             <a:endParaRPr lang="en-US"/>
           </a:p>
@@ -4532,7 +4532,7 @@
           <a:p>
             <a:fld id="{4F06803B-D602-4C3D-AD5C-468F46C70933}" type="datetimeFigureOut">
               <a:rPr lang="en-US" smtClean="0"/>
-              <a:t>1/13/2025</a:t>
+              <a:t>1/21/2025</a:t>
             </a:fld>
             <a:endParaRPr lang="en-US"/>
           </a:p>
@@ -4797,7 +4797,7 @@
           <a:p>
             <a:fld id="{4F06803B-D602-4C3D-AD5C-468F46C70933}" type="datetimeFigureOut">
               <a:rPr lang="en-US" smtClean="0"/>
-              <a:t>1/13/2025</a:t>
+              <a:t>1/21/2025</a:t>
             </a:fld>
             <a:endParaRPr lang="en-US"/>
           </a:p>
@@ -5209,7 +5209,7 @@
           <a:p>
             <a:fld id="{4F06803B-D602-4C3D-AD5C-468F46C70933}" type="datetimeFigureOut">
               <a:rPr lang="en-US" smtClean="0"/>
-              <a:t>1/13/2025</a:t>
+              <a:t>1/21/2025</a:t>
             </a:fld>
             <a:endParaRPr lang="en-US"/>
           </a:p>
@@ -5350,7 +5350,7 @@
           <a:p>
             <a:fld id="{4F06803B-D602-4C3D-AD5C-468F46C70933}" type="datetimeFigureOut">
               <a:rPr lang="en-US" smtClean="0"/>
-              <a:t>1/13/2025</a:t>
+              <a:t>1/21/2025</a:t>
             </a:fld>
             <a:endParaRPr lang="en-US"/>
           </a:p>
@@ -5463,7 +5463,7 @@
           <a:p>
             <a:fld id="{4F06803B-D602-4C3D-AD5C-468F46C70933}" type="datetimeFigureOut">
               <a:rPr lang="en-US" smtClean="0"/>
-              <a:t>1/13/2025</a:t>
+              <a:t>1/21/2025</a:t>
             </a:fld>
             <a:endParaRPr lang="en-US"/>
           </a:p>
@@ -5774,7 +5774,7 @@
           <a:p>
             <a:fld id="{4F06803B-D602-4C3D-AD5C-468F46C70933}" type="datetimeFigureOut">
               <a:rPr lang="en-US" smtClean="0"/>
-              <a:t>1/13/2025</a:t>
+              <a:t>1/21/2025</a:t>
             </a:fld>
             <a:endParaRPr lang="en-US"/>
           </a:p>
@@ -6062,7 +6062,7 @@
           <a:p>
             <a:fld id="{4F06803B-D602-4C3D-AD5C-468F46C70933}" type="datetimeFigureOut">
               <a:rPr lang="en-US" smtClean="0"/>
-              <a:t>1/13/2025</a:t>
+              <a:t>1/21/2025</a:t>
             </a:fld>
             <a:endParaRPr lang="en-US"/>
           </a:p>
@@ -6303,7 +6303,7 @@
           <a:p>
             <a:fld id="{4F06803B-D602-4C3D-AD5C-468F46C70933}" type="datetimeFigureOut">
               <a:rPr lang="en-US" smtClean="0"/>
-              <a:t>1/13/2025</a:t>
+              <a:t>1/21/2025</a:t>
             </a:fld>
             <a:endParaRPr lang="en-US"/>
           </a:p>
@@ -9583,155 +9583,121 @@
         </p:spPr>
         <p:txBody>
           <a:bodyPr>
-            <a:normAutofit fontScale="92500" lnSpcReduction="20000"/>
+            <a:normAutofit lnSpcReduction="10000"/>
           </a:bodyPr>
           <a:lstStyle/>
           <a:p>
             <a:pPr marL="514350" indent="-514350">
-              <a:lnSpc>
-                <a:spcPct val="110000"/>
-              </a:lnSpc>
               <a:buFont typeface="+mj-lt"/>
               <a:buAutoNum type="arabicPeriod"/>
             </a:pPr>
             <a:r>
-              <a:rPr lang="fr-FR" sz="2300" dirty="0"/>
+              <a:rPr lang="fr-FR" sz="2400" dirty="0"/>
               <a:t>Introduction to Deep Learning</a:t>
             </a:r>
           </a:p>
           <a:p>
             <a:pPr marL="514350" indent="-514350">
-              <a:lnSpc>
-                <a:spcPct val="110000"/>
-              </a:lnSpc>
               <a:buFont typeface="+mj-lt"/>
               <a:buAutoNum type="arabicPeriod"/>
             </a:pPr>
             <a:r>
-              <a:rPr lang="fr-FR" sz="2300" dirty="0" err="1"/>
+              <a:rPr lang="fr-FR" sz="2400" dirty="0"/>
               <a:t>PyTorch</a:t>
             </a:r>
-            <a:endParaRPr lang="fr-FR" sz="2300" dirty="0"/>
           </a:p>
           <a:p>
             <a:pPr marL="514350" indent="-514350">
-              <a:lnSpc>
-                <a:spcPct val="110000"/>
-              </a:lnSpc>
               <a:buFont typeface="+mj-lt"/>
               <a:buAutoNum type="arabicPeriod"/>
             </a:pPr>
             <a:r>
-              <a:rPr lang="en-US" sz="2300" b="1" dirty="0"/>
+              <a:rPr lang="en-US" sz="2400" b="1" dirty="0"/>
               <a:t>Optimizers review. Types of Machine Learning problems and their losses.</a:t>
             </a:r>
           </a:p>
           <a:p>
             <a:pPr marL="514350" indent="-514350">
-              <a:lnSpc>
-                <a:spcPct val="110000"/>
-              </a:lnSpc>
               <a:buFont typeface="+mj-lt"/>
               <a:buAutoNum type="arabicPeriod"/>
             </a:pPr>
             <a:r>
-              <a:rPr lang="en-US" sz="2300" dirty="0"/>
-              <a:t>Deep Learning Neural Network Architectures Overview Part. 1</a:t>
+              <a:rPr lang="en-US" sz="2400" dirty="0"/>
+              <a:t>Layers Types 1 (linear: width vs depth)</a:t>
             </a:r>
           </a:p>
           <a:p>
             <a:pPr marL="514350" indent="-514350">
-              <a:lnSpc>
-                <a:spcPct val="110000"/>
-              </a:lnSpc>
               <a:buFont typeface="+mj-lt"/>
               <a:buAutoNum type="arabicPeriod"/>
             </a:pPr>
             <a:r>
-              <a:rPr lang="en-US" sz="2300" dirty="0"/>
-              <a:t>Deep Learning Neural Network Architectures Overview Part. 2</a:t>
+              <a:rPr lang="en-US" sz="2400" dirty="0"/>
+              <a:t>Layers Types 2 (conv, pooling &amp; </a:t>
+            </a:r>
+            <a:r>
+              <a:rPr lang="en-US" sz="2400" dirty="0" err="1"/>
+              <a:t>softmax</a:t>
+            </a:r>
+            <a:r>
+              <a:rPr lang="en-US" sz="2400" dirty="0"/>
+              <a:t>)</a:t>
             </a:r>
           </a:p>
           <a:p>
             <a:pPr marL="514350" indent="-514350">
-              <a:lnSpc>
-                <a:spcPct val="110000"/>
-              </a:lnSpc>
               <a:buFont typeface="+mj-lt"/>
               <a:buAutoNum type="arabicPeriod"/>
             </a:pPr>
             <a:r>
-              <a:rPr lang="en-US" sz="2300" dirty="0"/>
-              <a:t>Deep Learning Neural Network Architectures Overview Part. 3</a:t>
+              <a:rPr lang="en-US" sz="2400" dirty="0"/>
+              <a:t>Architectures (RNN) &amp; Transfer Learning</a:t>
             </a:r>
           </a:p>
           <a:p>
             <a:pPr marL="514350" indent="-514350">
-              <a:lnSpc>
-                <a:spcPct val="110000"/>
-              </a:lnSpc>
               <a:buFont typeface="+mj-lt"/>
               <a:buAutoNum type="arabicPeriod"/>
             </a:pPr>
             <a:r>
-              <a:rPr lang="en-US" sz="2300" dirty="0"/>
-              <a:t>Practical session.</a:t>
+              <a:rPr lang="en-US" sz="2400" dirty="0"/>
+              <a:t>Practical Exercises and hyperparameter optimization</a:t>
             </a:r>
           </a:p>
           <a:p>
             <a:pPr marL="514350" indent="-514350">
-              <a:lnSpc>
-                <a:spcPct val="110000"/>
-              </a:lnSpc>
               <a:buFont typeface="+mj-lt"/>
               <a:buAutoNum type="arabicPeriod"/>
             </a:pPr>
             <a:r>
-              <a:rPr lang="en-US" sz="2300" dirty="0"/>
-              <a:t>Transfer Learning. </a:t>
-            </a:r>
-            <a:r>
-              <a:rPr lang="en-US" sz="2300"/>
-              <a:t>Data and gradient subtleties.</a:t>
-            </a:r>
-            <a:endParaRPr lang="en-US" sz="2300" dirty="0"/>
+              <a:rPr lang="en-US" sz="2400" dirty="0"/>
+              <a:t>Attention. Transformers.</a:t>
+            </a:r>
           </a:p>
           <a:p>
             <a:pPr marL="514350" indent="-514350">
-              <a:lnSpc>
-                <a:spcPct val="110000"/>
-              </a:lnSpc>
               <a:buFont typeface="+mj-lt"/>
               <a:buAutoNum type="arabicPeriod"/>
             </a:pPr>
             <a:r>
-              <a:rPr lang="en-US" sz="2300" dirty="0"/>
-              <a:t>Advanced Deep Learning (Transformers &amp; Stable Diffusion &amp; </a:t>
-            </a:r>
-            <a:r>
-              <a:rPr lang="en-US" sz="2300" dirty="0" err="1"/>
-              <a:t>LoRA</a:t>
-            </a:r>
-            <a:r>
-              <a:rPr lang="en-US" sz="2300" dirty="0"/>
-              <a:t>)</a:t>
-            </a:r>
+              <a:rPr lang="en-US" sz="2400" dirty="0"/>
+              <a:t>Text Generation. </a:t>
+            </a:r>
+            <a:r>
+              <a:rPr lang="en-GB" sz="2400" dirty="0"/>
+              <a:t>Low-Rank Adaptation of Large Language Models</a:t>
+            </a:r>
+            <a:endParaRPr lang="en-US" sz="2400" dirty="0"/>
           </a:p>
           <a:p>
             <a:pPr marL="514350" indent="-514350">
-              <a:lnSpc>
-                <a:spcPct val="110000"/>
-              </a:lnSpc>
               <a:buFont typeface="+mj-lt"/>
               <a:buAutoNum type="arabicPeriod"/>
             </a:pPr>
             <a:r>
-              <a:rPr lang="en-US" sz="2300" dirty="0"/>
+              <a:rPr lang="en-US" sz="2400" dirty="0"/>
               <a:t>Exam</a:t>
             </a:r>
-          </a:p>
-          <a:p>
-            <a:endParaRPr lang="fr-FR" dirty="0"/>
           </a:p>
         </p:txBody>
       </p:sp>

</xml_diff>